<commit_message>
Deploy website Tue Apr 16 13:15:41 PDT 2024
</commit_message>
<xml_diff>
--- a/assets/slides/sp24/23-Paradigms.pptx
+++ b/assets/slides/sp24/23-Paradigms.pptx
@@ -14594,12 +14594,8 @@
           <a:p>
             <a:pPr lvl="0"/>
             <a:r>
-              <a:rPr lang="en-US"/>
-              <a:t>Declarative </a:t>
-            </a:r>
-            <a:r>
-              <a:rPr lang="en-US" dirty="0"/>
-              <a:t>Programming</a:t>
+              <a:rPr lang="en-US" dirty="0"/>
+              <a:t>Declarative Programming</a:t>
             </a:r>
           </a:p>
         </p:txBody>
@@ -18420,7 +18416,35 @@
                 <a:latin typeface="Source Code Pro" panose="020B0309030403020204" pitchFamily="34" charset="0"/>
                 <a:ea typeface="Source Code Pro" panose="020B0309030403020204" pitchFamily="34" charset="0"/>
               </a:rPr>
-              <a:t> += [ 5 ]</a:t>
+              <a:t> += [ </a:t>
+            </a:r>
+            <a:r>
+              <a:rPr lang="en-US" dirty="0" err="1">
+                <a:latin typeface="Source Code Pro" panose="020B0309030403020204" pitchFamily="34" charset="0"/>
+                <a:ea typeface="Source Code Pro" panose="020B0309030403020204" pitchFamily="34" charset="0"/>
+              </a:rPr>
+              <a:t>i</a:t>
+            </a:r>
+            <a:r>
+              <a:rPr lang="en-US" dirty="0">
+                <a:latin typeface="Source Code Pro" panose="020B0309030403020204" pitchFamily="34" charset="0"/>
+                <a:ea typeface="Source Code Pro" panose="020B0309030403020204" pitchFamily="34" charset="0"/>
+              </a:rPr>
+              <a:t>*</a:t>
+            </a:r>
+            <a:r>
+              <a:rPr lang="en-US" dirty="0" err="1">
+                <a:latin typeface="Source Code Pro" panose="020B0309030403020204" pitchFamily="34" charset="0"/>
+                <a:ea typeface="Source Code Pro" panose="020B0309030403020204" pitchFamily="34" charset="0"/>
+              </a:rPr>
+              <a:t>i</a:t>
+            </a:r>
+            <a:r>
+              <a:rPr lang="en-US" dirty="0">
+                <a:latin typeface="Source Code Pro" panose="020B0309030403020204" pitchFamily="34" charset="0"/>
+                <a:ea typeface="Source Code Pro" panose="020B0309030403020204" pitchFamily="34" charset="0"/>
+              </a:rPr>
+              <a:t> ]</a:t>
             </a:r>
           </a:p>
           <a:p>

</xml_diff>